<commit_message>
i didnt do crap
</commit_message>
<xml_diff>
--- a/10_Momo/CAPER PowerPoints/CAPER_4.19.2016_MoreyAgnew.pptx
+++ b/10_Momo/CAPER PowerPoints/CAPER_4.19.2016_MoreyAgnew.pptx
@@ -224,7 +224,7 @@
           <a:p>
             <a:fld id="{85292355-EE37-4EC4-90EC-568BAF79238D}" type="datetimeFigureOut">
               <a:rPr lang="en-US" smtClean="0"/>
-              <a:t>4/19/2016</a:t>
+              <a:t>5/17/2016</a:t>
             </a:fld>
             <a:endParaRPr lang="en-US"/>
           </a:p>
@@ -1193,7 +1193,7 @@
           <a:p>
             <a:fld id="{BFE4ABA5-C905-4825-8872-D86BC7CBE79A}" type="datetimeFigureOut">
               <a:rPr lang="en-US" smtClean="0"/>
-              <a:t>4/19/2016</a:t>
+              <a:t>5/17/2016</a:t>
             </a:fld>
             <a:endParaRPr lang="en-US"/>
           </a:p>
@@ -1549,7 +1549,7 @@
           <a:p>
             <a:fld id="{BFE4ABA5-C905-4825-8872-D86BC7CBE79A}" type="datetimeFigureOut">
               <a:rPr lang="en-US" smtClean="0"/>
-              <a:t>4/19/2016</a:t>
+              <a:t>5/17/2016</a:t>
             </a:fld>
             <a:endParaRPr lang="en-US"/>
           </a:p>
@@ -3480,7 +3480,7 @@
           <a:p>
             <a:fld id="{BFE4ABA5-C905-4825-8872-D86BC7CBE79A}" type="datetimeFigureOut">
               <a:rPr lang="en-US" smtClean="0"/>
-              <a:t>4/19/2016</a:t>
+              <a:t>5/17/2016</a:t>
             </a:fld>
             <a:endParaRPr lang="en-US"/>
           </a:p>
@@ -3774,7 +3774,7 @@
           <a:p>
             <a:fld id="{BFE4ABA5-C905-4825-8872-D86BC7CBE79A}" type="datetimeFigureOut">
               <a:rPr lang="en-US" smtClean="0"/>
-              <a:t>4/19/2016</a:t>
+              <a:t>5/17/2016</a:t>
             </a:fld>
             <a:endParaRPr lang="en-US"/>
           </a:p>
@@ -4045,7 +4045,7 @@
           <a:p>
             <a:fld id="{BFE4ABA5-C905-4825-8872-D86BC7CBE79A}" type="datetimeFigureOut">
               <a:rPr lang="en-US" smtClean="0"/>
-              <a:t>4/19/2016</a:t>
+              <a:t>5/17/2016</a:t>
             </a:fld>
             <a:endParaRPr lang="en-US"/>
           </a:p>
@@ -4498,7 +4498,7 @@
           <a:p>
             <a:fld id="{BFE4ABA5-C905-4825-8872-D86BC7CBE79A}" type="datetimeFigureOut">
               <a:rPr lang="en-US" smtClean="0"/>
-              <a:t>4/19/2016</a:t>
+              <a:t>5/17/2016</a:t>
             </a:fld>
             <a:endParaRPr lang="en-US"/>
           </a:p>
@@ -4927,7 +4927,7 @@
           <a:p>
             <a:fld id="{BFE4ABA5-C905-4825-8872-D86BC7CBE79A}" type="datetimeFigureOut">
               <a:rPr lang="en-US" smtClean="0"/>
-              <a:t>4/19/2016</a:t>
+              <a:t>5/17/2016</a:t>
             </a:fld>
             <a:endParaRPr lang="en-US"/>
           </a:p>

</xml_diff>